<commit_message>
Add and update session 9 materials.
</commit_message>
<xml_diff>
--- a/CPSC-24700/Presentations/session-09.pptx
+++ b/CPSC-24700/Presentations/session-09.pptx
@@ -5,7 +5,7 @@
     <p:sldMasterId id="2147483648" r:id="rId1"/>
   </p:sldMasterIdLst>
   <p:notesMasterIdLst>
-    <p:notesMasterId r:id="rId10"/>
+    <p:notesMasterId r:id="rId9"/>
   </p:notesMasterIdLst>
   <p:sldIdLst>
     <p:sldId id="257" r:id="rId2"/>
@@ -14,8 +14,7 @@
     <p:sldId id="295" r:id="rId5"/>
     <p:sldId id="296" r:id="rId6"/>
     <p:sldId id="298" r:id="rId7"/>
-    <p:sldId id="282" r:id="rId8"/>
-    <p:sldId id="263" r:id="rId9"/>
+    <p:sldId id="263" r:id="rId8"/>
   </p:sldIdLst>
   <p:sldSz cx="12192000" cy="6858000"/>
   <p:notesSz cx="7315200" cy="9601200"/>
@@ -122,6 +121,10 @@
 </p:presentation>
 </file>
 
+<file path=ppt/revisionInfo.xml><?xml version="1.0" encoding="utf-8"?>
+<p1510:revInfo xmlns:a="http://schemas.openxmlformats.org/drawingml/2006/main" xmlns:r="http://schemas.openxmlformats.org/officeDocument/2006/relationships" xmlns:p1510="http://schemas.microsoft.com/office/powerpoint/2015/10/main"/>
+</file>
+
 <file path=ppt/notesMasters/notesMaster1.xml><?xml version="1.0" encoding="utf-8"?>
 <p:notesMaster xmlns:a="http://schemas.openxmlformats.org/drawingml/2006/main" xmlns:r="http://schemas.openxmlformats.org/officeDocument/2006/relationships" xmlns:p="http://schemas.openxmlformats.org/presentationml/2006/main">
   <p:cSld>
@@ -204,7 +207,7 @@
           <a:p>
             <a:fld id="{1CF91C02-A59E-4778-8D4F-4840DBBEFA68}" type="datetimeFigureOut">
               <a:rPr lang="en-US" smtClean="0"/>
-              <a:t>9/15/2017</a:t>
+              <a:t>9/18/2017</a:t>
             </a:fld>
             <a:endParaRPr lang="en-US"/>
           </a:p>
@@ -1063,14 +1066,6 @@
           <a:bodyPr/>
           <a:lstStyle/>
           <a:p>
-            <a:r>
-              <a:rPr lang="en-US" dirty="0"/>
-              <a:t>I have made the solution to our Week 3 lab available. My strong suggestion is to do you best on your own and using “normal” resources available to you (Web, classmates, etc.) and then use the solution as a last resort</a:t>
-            </a:r>
-            <a:r>
-              <a:rPr lang="en-US"/>
-              <a:t>. </a:t>
-            </a:r>
             <a:endParaRPr lang="en-US" dirty="0"/>
           </a:p>
         </p:txBody>
@@ -1093,90 +1088,6 @@
             <a:fld id="{5394DE12-7B9B-46AA-AC19-C30A49928B9B}" type="slidenum">
               <a:rPr lang="en-US" smtClean="0"/>
               <a:t>7</a:t>
-            </a:fld>
-            <a:endParaRPr lang="en-US" dirty="0"/>
-          </a:p>
-        </p:txBody>
-      </p:sp>
-    </p:spTree>
-    <p:extLst>
-      <p:ext uri="{BB962C8B-B14F-4D97-AF65-F5344CB8AC3E}">
-        <p14:creationId xmlns:p14="http://schemas.microsoft.com/office/powerpoint/2010/main" val="1961945529"/>
-      </p:ext>
-    </p:extLst>
-  </p:cSld>
-  <p:clrMapOvr>
-    <a:masterClrMapping/>
-  </p:clrMapOvr>
-</p:notes>
-</file>
-
-<file path=ppt/notesSlides/notesSlide8.xml><?xml version="1.0" encoding="utf-8"?>
-<p:notes xmlns:a="http://schemas.openxmlformats.org/drawingml/2006/main" xmlns:r="http://schemas.openxmlformats.org/officeDocument/2006/relationships" xmlns:p="http://schemas.openxmlformats.org/presentationml/2006/main">
-  <p:cSld>
-    <p:spTree>
-      <p:nvGrpSpPr>
-        <p:cNvPr id="1" name=""/>
-        <p:cNvGrpSpPr/>
-        <p:nvPr/>
-      </p:nvGrpSpPr>
-      <p:grpSpPr>
-        <a:xfrm>
-          <a:off x="0" y="0"/>
-          <a:ext cx="0" cy="0"/>
-          <a:chOff x="0" y="0"/>
-          <a:chExt cx="0" cy="0"/>
-        </a:xfrm>
-      </p:grpSpPr>
-      <p:sp>
-        <p:nvSpPr>
-          <p:cNvPr id="2" name="Slide Image Placeholder 1"/>
-          <p:cNvSpPr>
-            <a:spLocks noGrp="1" noRot="1" noChangeAspect="1"/>
-          </p:cNvSpPr>
-          <p:nvPr>
-            <p:ph type="sldImg"/>
-          </p:nvPr>
-        </p:nvSpPr>
-        <p:spPr/>
-      </p:sp>
-      <p:sp>
-        <p:nvSpPr>
-          <p:cNvPr id="3" name="Notes Placeholder 2"/>
-          <p:cNvSpPr>
-            <a:spLocks noGrp="1"/>
-          </p:cNvSpPr>
-          <p:nvPr>
-            <p:ph type="body" idx="1"/>
-          </p:nvPr>
-        </p:nvSpPr>
-        <p:spPr/>
-        <p:txBody>
-          <a:bodyPr/>
-          <a:lstStyle/>
-          <a:p>
-            <a:endParaRPr lang="en-US" dirty="0"/>
-          </a:p>
-        </p:txBody>
-      </p:sp>
-      <p:sp>
-        <p:nvSpPr>
-          <p:cNvPr id="4" name="Slide Number Placeholder 3"/>
-          <p:cNvSpPr>
-            <a:spLocks noGrp="1"/>
-          </p:cNvSpPr>
-          <p:nvPr>
-            <p:ph type="sldNum" sz="quarter" idx="10"/>
-          </p:nvPr>
-        </p:nvSpPr>
-        <p:spPr/>
-        <p:txBody>
-          <a:bodyPr/>
-          <a:lstStyle/>
-          <a:p>
-            <a:fld id="{5394DE12-7B9B-46AA-AC19-C30A49928B9B}" type="slidenum">
-              <a:rPr lang="en-US" smtClean="0"/>
-              <a:t>8</a:t>
             </a:fld>
             <a:endParaRPr lang="en-US" dirty="0"/>
           </a:p>
@@ -1342,7 +1253,7 @@
           <a:p>
             <a:fld id="{5FB62F81-FD80-4AA8-93CA-E835B40BE667}" type="datetimeFigureOut">
               <a:rPr lang="en-US" smtClean="0"/>
-              <a:t>9/15/2017</a:t>
+              <a:t>9/18/2017</a:t>
             </a:fld>
             <a:endParaRPr lang="en-US"/>
           </a:p>
@@ -1540,7 +1451,7 @@
           <a:p>
             <a:fld id="{5FB62F81-FD80-4AA8-93CA-E835B40BE667}" type="datetimeFigureOut">
               <a:rPr lang="en-US" smtClean="0"/>
-              <a:t>9/15/2017</a:t>
+              <a:t>9/18/2017</a:t>
             </a:fld>
             <a:endParaRPr lang="en-US"/>
           </a:p>
@@ -1748,7 +1659,7 @@
           <a:p>
             <a:fld id="{5FB62F81-FD80-4AA8-93CA-E835B40BE667}" type="datetimeFigureOut">
               <a:rPr lang="en-US" smtClean="0"/>
-              <a:t>9/15/2017</a:t>
+              <a:t>9/18/2017</a:t>
             </a:fld>
             <a:endParaRPr lang="en-US"/>
           </a:p>
@@ -1946,7 +1857,7 @@
           <a:p>
             <a:fld id="{5FB62F81-FD80-4AA8-93CA-E835B40BE667}" type="datetimeFigureOut">
               <a:rPr lang="en-US" smtClean="0"/>
-              <a:t>9/15/2017</a:t>
+              <a:t>9/18/2017</a:t>
             </a:fld>
             <a:endParaRPr lang="en-US"/>
           </a:p>
@@ -2221,7 +2132,7 @@
           <a:p>
             <a:fld id="{5FB62F81-FD80-4AA8-93CA-E835B40BE667}" type="datetimeFigureOut">
               <a:rPr lang="en-US" smtClean="0"/>
-              <a:t>9/15/2017</a:t>
+              <a:t>9/18/2017</a:t>
             </a:fld>
             <a:endParaRPr lang="en-US"/>
           </a:p>
@@ -2486,7 +2397,7 @@
           <a:p>
             <a:fld id="{5FB62F81-FD80-4AA8-93CA-E835B40BE667}" type="datetimeFigureOut">
               <a:rPr lang="en-US" smtClean="0"/>
-              <a:t>9/15/2017</a:t>
+              <a:t>9/18/2017</a:t>
             </a:fld>
             <a:endParaRPr lang="en-US"/>
           </a:p>
@@ -2898,7 +2809,7 @@
           <a:p>
             <a:fld id="{5FB62F81-FD80-4AA8-93CA-E835B40BE667}" type="datetimeFigureOut">
               <a:rPr lang="en-US" smtClean="0"/>
-              <a:t>9/15/2017</a:t>
+              <a:t>9/18/2017</a:t>
             </a:fld>
             <a:endParaRPr lang="en-US"/>
           </a:p>
@@ -3039,7 +2950,7 @@
           <a:p>
             <a:fld id="{5FB62F81-FD80-4AA8-93CA-E835B40BE667}" type="datetimeFigureOut">
               <a:rPr lang="en-US" smtClean="0"/>
-              <a:t>9/15/2017</a:t>
+              <a:t>9/18/2017</a:t>
             </a:fld>
             <a:endParaRPr lang="en-US"/>
           </a:p>
@@ -3152,7 +3063,7 @@
           <a:p>
             <a:fld id="{5FB62F81-FD80-4AA8-93CA-E835B40BE667}" type="datetimeFigureOut">
               <a:rPr lang="en-US" smtClean="0"/>
-              <a:t>9/15/2017</a:t>
+              <a:t>9/18/2017</a:t>
             </a:fld>
             <a:endParaRPr lang="en-US"/>
           </a:p>
@@ -3463,7 +3374,7 @@
           <a:p>
             <a:fld id="{5FB62F81-FD80-4AA8-93CA-E835B40BE667}" type="datetimeFigureOut">
               <a:rPr lang="en-US" smtClean="0"/>
-              <a:t>9/15/2017</a:t>
+              <a:t>9/18/2017</a:t>
             </a:fld>
             <a:endParaRPr lang="en-US"/>
           </a:p>
@@ -3751,7 +3662,7 @@
           <a:p>
             <a:fld id="{5FB62F81-FD80-4AA8-93CA-E835B40BE667}" type="datetimeFigureOut">
               <a:rPr lang="en-US" smtClean="0"/>
-              <a:t>9/15/2017</a:t>
+              <a:t>9/18/2017</a:t>
             </a:fld>
             <a:endParaRPr lang="en-US"/>
           </a:p>
@@ -3992,7 +3903,7 @@
           <a:p>
             <a:fld id="{5FB62F81-FD80-4AA8-93CA-E835B40BE667}" type="datetimeFigureOut">
               <a:rPr lang="en-US" smtClean="0"/>
-              <a:t>9/15/2017</a:t>
+              <a:t>9/18/2017</a:t>
             </a:fld>
             <a:endParaRPr lang="en-US"/>
           </a:p>
@@ -4496,7 +4407,7 @@
             </a:pPr>
             <a:r>
               <a:rPr lang="en-US" sz="2000" dirty="0"/>
-              <a:t>Friendly Conversation &amp; Good Natured Banter…  ***?</a:t>
+              <a:t>Friendly Conversation &amp; Good Natured Banter</a:t>
             </a:r>
           </a:p>
           <a:p>
@@ -4516,7 +4427,7 @@
             </a:pPr>
             <a:r>
               <a:rPr lang="en-US" sz="2000" dirty="0"/>
-              <a:t>Cascading Style Sheets (CSS)</a:t>
+              <a:t>JavaScript Basics</a:t>
             </a:r>
           </a:p>
           <a:p>
@@ -4526,7 +4437,7 @@
             </a:pPr>
             <a:r>
               <a:rPr lang="en-US" sz="2000" dirty="0"/>
-              <a:t>Week 4 Lab</a:t>
+              <a:t>Assignments and Pre-lab Wrap-up</a:t>
             </a:r>
           </a:p>
           <a:p>
@@ -4536,7 +4447,7 @@
             </a:pPr>
             <a:r>
               <a:rPr lang="en-US" sz="2000" dirty="0"/>
-              <a:t>Assignments and Pre-lab Wrap-up</a:t>
+              <a:t>Week 4 Lab: Course Schedule with (external) CSS </a:t>
             </a:r>
           </a:p>
           <a:p>
@@ -4724,7 +4635,7 @@
           <a:p>
             <a:r>
               <a:rPr lang="en-US" sz="2000" dirty="0"/>
-              <a:t>Complete Ch.3 of Sebesta (CSS)</a:t>
+              <a:t>Project 1</a:t>
             </a:r>
           </a:p>
         </p:txBody>
@@ -4783,7 +4694,7 @@
           <a:p>
             <a:r>
               <a:rPr lang="en-US" sz="4800" dirty="0"/>
-              <a:t>Cascading Style Sheets (CSS)</a:t>
+              <a:t>JavaScript Basics</a:t>
             </a:r>
           </a:p>
         </p:txBody>
@@ -4895,8 +4806,23 @@
           <a:p>
             <a:r>
               <a:rPr lang="en-US" sz="2000" dirty="0"/>
-              <a:t>Finish Project 1</a:t>
-            </a:r>
+              <a:t>Finish Project 1 if you haven’t already</a:t>
+            </a:r>
+          </a:p>
+          <a:p>
+            <a:r>
+              <a:rPr lang="en-US" sz="2000" dirty="0"/>
+              <a:t>Ch.4.1 to 4.6 of Sebesta</a:t>
+            </a:r>
+          </a:p>
+          <a:p>
+            <a:pPr marL="0" indent="0">
+              <a:buNone/>
+            </a:pPr>
+            <a:endParaRPr lang="en-US" sz="2000" dirty="0"/>
+          </a:p>
+          <a:p>
+            <a:endParaRPr lang="en-US" sz="2000" dirty="0"/>
           </a:p>
         </p:txBody>
       </p:sp>
@@ -5075,14 +5001,14 @@
           <a:p>
             <a:r>
               <a:rPr lang="en-US" sz="4800" dirty="0"/>
-              <a:t>Week 3 Lab Solution: </a:t>
+              <a:t>Week 4 Lab:</a:t>
             </a:r>
             <a:br>
               <a:rPr lang="en-US" sz="4800" dirty="0"/>
             </a:br>
             <a:r>
               <a:rPr lang="en-US" sz="4800" dirty="0"/>
-              <a:t>Course Schedule</a:t>
+              <a:t>Course Schedule with (external) CSS</a:t>
             </a:r>
           </a:p>
         </p:txBody>
@@ -5101,65 +5027,6 @@
 </file>
 
 <file path=ppt/slides/slide7.xml><?xml version="1.0" encoding="utf-8"?>
-<p:sld xmlns:a="http://schemas.openxmlformats.org/drawingml/2006/main" xmlns:r="http://schemas.openxmlformats.org/officeDocument/2006/relationships" xmlns:p="http://schemas.openxmlformats.org/presentationml/2006/main">
-  <p:cSld>
-    <p:spTree>
-      <p:nvGrpSpPr>
-        <p:cNvPr id="1" name=""/>
-        <p:cNvGrpSpPr/>
-        <p:nvPr/>
-      </p:nvGrpSpPr>
-      <p:grpSpPr>
-        <a:xfrm>
-          <a:off x="0" y="0"/>
-          <a:ext cx="0" cy="0"/>
-          <a:chOff x="0" y="0"/>
-          <a:chExt cx="0" cy="0"/>
-        </a:xfrm>
-      </p:grpSpPr>
-      <p:sp>
-        <p:nvSpPr>
-          <p:cNvPr id="2" name="Title 1"/>
-          <p:cNvSpPr>
-            <a:spLocks noGrp="1"/>
-          </p:cNvSpPr>
-          <p:nvPr>
-            <p:ph type="ctrTitle"/>
-          </p:nvPr>
-        </p:nvSpPr>
-        <p:spPr>
-          <a:xfrm>
-            <a:off x="1524000" y="1122363"/>
-            <a:ext cx="9144000" cy="2892196"/>
-          </a:xfrm>
-        </p:spPr>
-        <p:txBody>
-          <a:bodyPr>
-            <a:normAutofit/>
-          </a:bodyPr>
-          <a:lstStyle/>
-          <a:p>
-            <a:r>
-              <a:rPr lang="en-US" sz="4800" dirty="0"/>
-              <a:t>Deploy Project #1 to “Test”</a:t>
-            </a:r>
-          </a:p>
-        </p:txBody>
-      </p:sp>
-    </p:spTree>
-    <p:extLst>
-      <p:ext uri="{BB962C8B-B14F-4D97-AF65-F5344CB8AC3E}">
-        <p14:creationId xmlns:p14="http://schemas.microsoft.com/office/powerpoint/2010/main" val="3587547239"/>
-      </p:ext>
-    </p:extLst>
-  </p:cSld>
-  <p:clrMapOvr>
-    <a:masterClrMapping/>
-  </p:clrMapOvr>
-</p:sld>
-</file>
-
-<file path=ppt/slides/slide8.xml><?xml version="1.0" encoding="utf-8"?>
 <p:sld xmlns:a="http://schemas.openxmlformats.org/drawingml/2006/main" xmlns:r="http://schemas.openxmlformats.org/officeDocument/2006/relationships" xmlns:p="http://schemas.openxmlformats.org/presentationml/2006/main">
   <p:cSld>
     <p:bg>

</xml_diff>